<commit_message>
hw 7 and queries for project
</commit_message>
<xml_diff>
--- a/project/projectERD.pptx
+++ b/project/projectERD.pptx
@@ -243,7 +243,7 @@
           <a:p>
             <a:fld id="{161988D9-0628-4717-8CAD-4A3F2FE80BFA}" type="datetimeFigureOut">
               <a:rPr lang="en-US" smtClean="0"/>
-              <a:t>3/2/2017</a:t>
+              <a:t>3/27/2017</a:t>
             </a:fld>
             <a:endParaRPr lang="en-US"/>
           </a:p>
@@ -413,7 +413,7 @@
           <a:p>
             <a:fld id="{161988D9-0628-4717-8CAD-4A3F2FE80BFA}" type="datetimeFigureOut">
               <a:rPr lang="en-US" smtClean="0"/>
-              <a:t>3/2/2017</a:t>
+              <a:t>3/27/2017</a:t>
             </a:fld>
             <a:endParaRPr lang="en-US"/>
           </a:p>
@@ -593,7 +593,7 @@
           <a:p>
             <a:fld id="{161988D9-0628-4717-8CAD-4A3F2FE80BFA}" type="datetimeFigureOut">
               <a:rPr lang="en-US" smtClean="0"/>
-              <a:t>3/2/2017</a:t>
+              <a:t>3/27/2017</a:t>
             </a:fld>
             <a:endParaRPr lang="en-US"/>
           </a:p>
@@ -763,7 +763,7 @@
           <a:p>
             <a:fld id="{161988D9-0628-4717-8CAD-4A3F2FE80BFA}" type="datetimeFigureOut">
               <a:rPr lang="en-US" smtClean="0"/>
-              <a:t>3/2/2017</a:t>
+              <a:t>3/27/2017</a:t>
             </a:fld>
             <a:endParaRPr lang="en-US"/>
           </a:p>
@@ -1009,7 +1009,7 @@
           <a:p>
             <a:fld id="{161988D9-0628-4717-8CAD-4A3F2FE80BFA}" type="datetimeFigureOut">
               <a:rPr lang="en-US" smtClean="0"/>
-              <a:t>3/2/2017</a:t>
+              <a:t>3/27/2017</a:t>
             </a:fld>
             <a:endParaRPr lang="en-US"/>
           </a:p>
@@ -1241,7 +1241,7 @@
           <a:p>
             <a:fld id="{161988D9-0628-4717-8CAD-4A3F2FE80BFA}" type="datetimeFigureOut">
               <a:rPr lang="en-US" smtClean="0"/>
-              <a:t>3/2/2017</a:t>
+              <a:t>3/27/2017</a:t>
             </a:fld>
             <a:endParaRPr lang="en-US"/>
           </a:p>
@@ -1608,7 +1608,7 @@
           <a:p>
             <a:fld id="{161988D9-0628-4717-8CAD-4A3F2FE80BFA}" type="datetimeFigureOut">
               <a:rPr lang="en-US" smtClean="0"/>
-              <a:t>3/2/2017</a:t>
+              <a:t>3/27/2017</a:t>
             </a:fld>
             <a:endParaRPr lang="en-US"/>
           </a:p>
@@ -1726,7 +1726,7 @@
           <a:p>
             <a:fld id="{161988D9-0628-4717-8CAD-4A3F2FE80BFA}" type="datetimeFigureOut">
               <a:rPr lang="en-US" smtClean="0"/>
-              <a:t>3/2/2017</a:t>
+              <a:t>3/27/2017</a:t>
             </a:fld>
             <a:endParaRPr lang="en-US"/>
           </a:p>
@@ -1821,7 +1821,7 @@
           <a:p>
             <a:fld id="{161988D9-0628-4717-8CAD-4A3F2FE80BFA}" type="datetimeFigureOut">
               <a:rPr lang="en-US" smtClean="0"/>
-              <a:t>3/2/2017</a:t>
+              <a:t>3/27/2017</a:t>
             </a:fld>
             <a:endParaRPr lang="en-US"/>
           </a:p>
@@ -2098,7 +2098,7 @@
           <a:p>
             <a:fld id="{161988D9-0628-4717-8CAD-4A3F2FE80BFA}" type="datetimeFigureOut">
               <a:rPr lang="en-US" smtClean="0"/>
-              <a:t>3/2/2017</a:t>
+              <a:t>3/27/2017</a:t>
             </a:fld>
             <a:endParaRPr lang="en-US"/>
           </a:p>
@@ -2351,7 +2351,7 @@
           <a:p>
             <a:fld id="{161988D9-0628-4717-8CAD-4A3F2FE80BFA}" type="datetimeFigureOut">
               <a:rPr lang="en-US" smtClean="0"/>
-              <a:t>3/2/2017</a:t>
+              <a:t>3/27/2017</a:t>
             </a:fld>
             <a:endParaRPr lang="en-US"/>
           </a:p>
@@ -2564,7 +2564,7 @@
           <a:p>
             <a:fld id="{161988D9-0628-4717-8CAD-4A3F2FE80BFA}" type="datetimeFigureOut">
               <a:rPr lang="en-US" smtClean="0"/>
-              <a:t>3/2/2017</a:t>
+              <a:t>3/27/2017</a:t>
             </a:fld>
             <a:endParaRPr lang="en-US"/>
           </a:p>
@@ -3270,12 +3270,8 @@
           <a:p>
             <a:pPr algn="ctr"/>
             <a:r>
-              <a:rPr lang="en-US" sz="1200" dirty="0" err="1"/>
-              <a:t>c</a:t>
-            </a:r>
-            <a:r>
               <a:rPr lang="en-US" sz="1200" dirty="0" err="1" smtClean="0"/>
-              <a:t>lean_shets</a:t>
+              <a:t>clean_sheets</a:t>
             </a:r>
             <a:endParaRPr lang="en-US" sz="1200" dirty="0"/>
           </a:p>
@@ -5297,7 +5293,7 @@
         <p:spPr>
           <a:xfrm>
             <a:off x="1442837" y="2325443"/>
-            <a:ext cx="428322" cy="246221"/>
+            <a:ext cx="426720" cy="246221"/>
           </a:xfrm>
           <a:prstGeom prst="rect">
             <a:avLst/>
@@ -5312,7 +5308,11 @@
           <a:p>
             <a:r>
               <a:rPr lang="en-US" sz="1000" dirty="0" smtClean="0"/>
-              <a:t>{1,1}</a:t>
+              <a:t>{1</a:t>
+            </a:r>
+            <a:r>
+              <a:rPr lang="en-US" sz="1000" dirty="0" smtClean="0"/>
+              <a:t>,*}</a:t>
             </a:r>
             <a:endParaRPr lang="en-US" sz="1000" dirty="0"/>
           </a:p>
@@ -5342,7 +5342,7 @@
           <a:p>
             <a:r>
               <a:rPr lang="en-US" sz="1200" dirty="0" smtClean="0"/>
-              <a:t>{1,*}</a:t>
+              <a:t>{*,1}</a:t>
             </a:r>
             <a:endParaRPr lang="en-US" sz="1200" dirty="0"/>
           </a:p>
@@ -5357,7 +5357,7 @@
         <p:spPr>
           <a:xfrm>
             <a:off x="3787948" y="1759662"/>
-            <a:ext cx="428322" cy="246221"/>
+            <a:ext cx="465192" cy="246221"/>
           </a:xfrm>
           <a:prstGeom prst="rect">
             <a:avLst/>
@@ -5372,7 +5372,11 @@
           <a:p>
             <a:r>
               <a:rPr lang="en-US" sz="1000" dirty="0" smtClean="0"/>
-              <a:t>{1,1}</a:t>
+              <a:t>{</a:t>
+            </a:r>
+            <a:r>
+              <a:rPr lang="en-US" sz="1000" dirty="0" smtClean="0"/>
+              <a:t>1,m}</a:t>
             </a:r>
             <a:endParaRPr lang="en-US" sz="1000" dirty="0"/>
           </a:p>
@@ -5541,7 +5545,7 @@
         <p:spPr>
           <a:xfrm>
             <a:off x="8097489" y="5581382"/>
-            <a:ext cx="428322" cy="246221"/>
+            <a:ext cx="465192" cy="246221"/>
           </a:xfrm>
           <a:prstGeom prst="rect">
             <a:avLst/>
@@ -5556,7 +5560,11 @@
           <a:p>
             <a:r>
               <a:rPr lang="en-US" sz="1000" dirty="0" smtClean="0"/>
-              <a:t>{1,1}</a:t>
+              <a:t>{m,1</a:t>
+            </a:r>
+            <a:r>
+              <a:rPr lang="en-US" sz="1000" dirty="0" smtClean="0"/>
+              <a:t>}</a:t>
             </a:r>
             <a:endParaRPr lang="en-US" sz="1000" dirty="0"/>
           </a:p>
@@ -5571,7 +5579,7 @@
         <p:spPr>
           <a:xfrm>
             <a:off x="6353963" y="4580095"/>
-            <a:ext cx="428322" cy="246221"/>
+            <a:ext cx="465192" cy="246221"/>
           </a:xfrm>
           <a:prstGeom prst="rect">
             <a:avLst/>
@@ -5586,7 +5594,11 @@
           <a:p>
             <a:r>
               <a:rPr lang="en-US" sz="1000" dirty="0" smtClean="0"/>
-              <a:t>{1,1}</a:t>
+              <a:t>{m,1</a:t>
+            </a:r>
+            <a:r>
+              <a:rPr lang="en-US" sz="1000" dirty="0" smtClean="0"/>
+              <a:t>}</a:t>
             </a:r>
             <a:endParaRPr lang="en-US" sz="1000" dirty="0"/>
           </a:p>
@@ -6057,6 +6069,605 @@
           </a:fontRef>
         </p:style>
       </p:cxnSp>
+      <p:sp>
+        <p:nvSpPr>
+          <p:cNvPr id="2" name="Oval 1"/>
+          <p:cNvSpPr/>
+          <p:nvPr/>
+        </p:nvSpPr>
+        <p:spPr>
+          <a:xfrm>
+            <a:off x="8470968" y="234387"/>
+            <a:ext cx="990222" cy="259186"/>
+          </a:xfrm>
+          <a:prstGeom prst="ellipse">
+            <a:avLst/>
+          </a:prstGeom>
+        </p:spPr>
+        <p:style>
+          <a:lnRef idx="2">
+            <a:schemeClr val="accent1">
+              <a:shade val="50000"/>
+            </a:schemeClr>
+          </a:lnRef>
+          <a:fillRef idx="1">
+            <a:schemeClr val="accent1"/>
+          </a:fillRef>
+          <a:effectRef idx="0">
+            <a:schemeClr val="accent1"/>
+          </a:effectRef>
+          <a:fontRef idx="minor">
+            <a:schemeClr val="lt1"/>
+          </a:fontRef>
+        </p:style>
+        <p:txBody>
+          <a:bodyPr rtlCol="0" anchor="ctr"/>
+          <a:lstStyle/>
+          <a:p>
+            <a:pPr algn="ctr"/>
+            <a:r>
+              <a:rPr lang="en-US" sz="1200" dirty="0" smtClean="0"/>
+              <a:t>assists</a:t>
+            </a:r>
+            <a:endParaRPr lang="en-US" sz="1200" dirty="0"/>
+          </a:p>
+        </p:txBody>
+      </p:sp>
+      <p:sp>
+        <p:nvSpPr>
+          <p:cNvPr id="7" name="Oval 6"/>
+          <p:cNvSpPr/>
+          <p:nvPr/>
+        </p:nvSpPr>
+        <p:spPr>
+          <a:xfrm>
+            <a:off x="7753082" y="555400"/>
+            <a:ext cx="927279" cy="307485"/>
+          </a:xfrm>
+          <a:prstGeom prst="ellipse">
+            <a:avLst/>
+          </a:prstGeom>
+        </p:spPr>
+        <p:style>
+          <a:lnRef idx="2">
+            <a:schemeClr val="accent1">
+              <a:shade val="50000"/>
+            </a:schemeClr>
+          </a:lnRef>
+          <a:fillRef idx="1">
+            <a:schemeClr val="accent1"/>
+          </a:fillRef>
+          <a:effectRef idx="0">
+            <a:schemeClr val="accent1"/>
+          </a:effectRef>
+          <a:fontRef idx="minor">
+            <a:schemeClr val="lt1"/>
+          </a:fontRef>
+        </p:style>
+        <p:txBody>
+          <a:bodyPr rtlCol="0" anchor="ctr"/>
+          <a:lstStyle/>
+          <a:p>
+            <a:pPr algn="ctr"/>
+            <a:r>
+              <a:rPr lang="en-US" sz="1200" dirty="0" smtClean="0"/>
+              <a:t>goals</a:t>
+            </a:r>
+            <a:endParaRPr lang="en-US" sz="1200" dirty="0"/>
+          </a:p>
+        </p:txBody>
+      </p:sp>
+      <p:sp>
+        <p:nvSpPr>
+          <p:cNvPr id="16" name="Oval 15"/>
+          <p:cNvSpPr/>
+          <p:nvPr/>
+        </p:nvSpPr>
+        <p:spPr>
+          <a:xfrm>
+            <a:off x="9133085" y="618337"/>
+            <a:ext cx="1446910" cy="368393"/>
+          </a:xfrm>
+          <a:prstGeom prst="ellipse">
+            <a:avLst/>
+          </a:prstGeom>
+        </p:spPr>
+        <p:style>
+          <a:lnRef idx="2">
+            <a:schemeClr val="accent1">
+              <a:shade val="50000"/>
+            </a:schemeClr>
+          </a:lnRef>
+          <a:fillRef idx="1">
+            <a:schemeClr val="accent1"/>
+          </a:fillRef>
+          <a:effectRef idx="0">
+            <a:schemeClr val="accent1"/>
+          </a:effectRef>
+          <a:fontRef idx="minor">
+            <a:schemeClr val="lt1"/>
+          </a:fontRef>
+        </p:style>
+        <p:txBody>
+          <a:bodyPr rtlCol="0" anchor="ctr"/>
+          <a:lstStyle/>
+          <a:p>
+            <a:pPr algn="ctr"/>
+            <a:r>
+              <a:rPr lang="en-US" sz="1200" dirty="0" err="1" smtClean="0"/>
+              <a:t>Clean_sheets</a:t>
+            </a:r>
+            <a:endParaRPr lang="en-US" sz="1200" dirty="0"/>
+          </a:p>
+        </p:txBody>
+      </p:sp>
+      <p:sp>
+        <p:nvSpPr>
+          <p:cNvPr id="21" name="Oval 20"/>
+          <p:cNvSpPr/>
+          <p:nvPr/>
+        </p:nvSpPr>
+        <p:spPr>
+          <a:xfrm>
+            <a:off x="6313866" y="978091"/>
+            <a:ext cx="936930" cy="323583"/>
+          </a:xfrm>
+          <a:prstGeom prst="ellipse">
+            <a:avLst/>
+          </a:prstGeom>
+        </p:spPr>
+        <p:style>
+          <a:lnRef idx="2">
+            <a:schemeClr val="accent1">
+              <a:shade val="50000"/>
+            </a:schemeClr>
+          </a:lnRef>
+          <a:fillRef idx="1">
+            <a:schemeClr val="accent1"/>
+          </a:fillRef>
+          <a:effectRef idx="0">
+            <a:schemeClr val="accent1"/>
+          </a:effectRef>
+          <a:fontRef idx="minor">
+            <a:schemeClr val="lt1"/>
+          </a:fontRef>
+        </p:style>
+        <p:txBody>
+          <a:bodyPr rtlCol="0" anchor="ctr"/>
+          <a:lstStyle/>
+          <a:p>
+            <a:pPr algn="ctr"/>
+            <a:r>
+              <a:rPr lang="en-US" sz="1200" dirty="0" smtClean="0"/>
+              <a:t>played</a:t>
+            </a:r>
+            <a:endParaRPr lang="en-US" sz="1200" dirty="0"/>
+          </a:p>
+        </p:txBody>
+      </p:sp>
+      <p:cxnSp>
+        <p:nvCxnSpPr>
+          <p:cNvPr id="23" name="Straight Connector 22"/>
+          <p:cNvCxnSpPr>
+            <a:stCxn id="21" idx="4"/>
+            <a:endCxn id="163" idx="0"/>
+          </p:cNvCxnSpPr>
+          <p:nvPr/>
+        </p:nvCxnSpPr>
+        <p:spPr>
+          <a:xfrm>
+            <a:off x="6782331" y="1301674"/>
+            <a:ext cx="1402192" cy="166514"/>
+          </a:xfrm>
+          <a:prstGeom prst="line">
+            <a:avLst/>
+          </a:prstGeom>
+        </p:spPr>
+        <p:style>
+          <a:lnRef idx="1">
+            <a:schemeClr val="accent1"/>
+          </a:lnRef>
+          <a:fillRef idx="0">
+            <a:schemeClr val="accent1"/>
+          </a:fillRef>
+          <a:effectRef idx="0">
+            <a:schemeClr val="accent1"/>
+          </a:effectRef>
+          <a:fontRef idx="minor">
+            <a:schemeClr val="tx1"/>
+          </a:fontRef>
+        </p:style>
+      </p:cxnSp>
+      <p:cxnSp>
+        <p:nvCxnSpPr>
+          <p:cNvPr id="28" name="Straight Connector 27"/>
+          <p:cNvCxnSpPr>
+            <a:stCxn id="7" idx="4"/>
+            <a:endCxn id="163" idx="0"/>
+          </p:cNvCxnSpPr>
+          <p:nvPr/>
+        </p:nvCxnSpPr>
+        <p:spPr>
+          <a:xfrm flipH="1">
+            <a:off x="8184523" y="862885"/>
+            <a:ext cx="32199" cy="605303"/>
+          </a:xfrm>
+          <a:prstGeom prst="line">
+            <a:avLst/>
+          </a:prstGeom>
+        </p:spPr>
+        <p:style>
+          <a:lnRef idx="1">
+            <a:schemeClr val="accent1"/>
+          </a:lnRef>
+          <a:fillRef idx="0">
+            <a:schemeClr val="accent1"/>
+          </a:fillRef>
+          <a:effectRef idx="0">
+            <a:schemeClr val="accent1"/>
+          </a:effectRef>
+          <a:fontRef idx="minor">
+            <a:schemeClr val="tx1"/>
+          </a:fontRef>
+        </p:style>
+      </p:cxnSp>
+      <p:cxnSp>
+        <p:nvCxnSpPr>
+          <p:cNvPr id="34" name="Straight Connector 33"/>
+          <p:cNvCxnSpPr>
+            <a:stCxn id="2" idx="4"/>
+            <a:endCxn id="163" idx="0"/>
+          </p:cNvCxnSpPr>
+          <p:nvPr/>
+        </p:nvCxnSpPr>
+        <p:spPr>
+          <a:xfrm flipH="1">
+            <a:off x="8184523" y="493573"/>
+            <a:ext cx="781556" cy="974615"/>
+          </a:xfrm>
+          <a:prstGeom prst="line">
+            <a:avLst/>
+          </a:prstGeom>
+        </p:spPr>
+        <p:style>
+          <a:lnRef idx="1">
+            <a:schemeClr val="accent1"/>
+          </a:lnRef>
+          <a:fillRef idx="0">
+            <a:schemeClr val="accent1"/>
+          </a:fillRef>
+          <a:effectRef idx="0">
+            <a:schemeClr val="accent1"/>
+          </a:effectRef>
+          <a:fontRef idx="minor">
+            <a:schemeClr val="tx1"/>
+          </a:fontRef>
+        </p:style>
+      </p:cxnSp>
+      <p:cxnSp>
+        <p:nvCxnSpPr>
+          <p:cNvPr id="40" name="Straight Connector 39"/>
+          <p:cNvCxnSpPr>
+            <a:stCxn id="16" idx="4"/>
+            <a:endCxn id="163" idx="0"/>
+          </p:cNvCxnSpPr>
+          <p:nvPr/>
+        </p:nvCxnSpPr>
+        <p:spPr>
+          <a:xfrm flipH="1">
+            <a:off x="8184523" y="986730"/>
+            <a:ext cx="1672017" cy="481458"/>
+          </a:xfrm>
+          <a:prstGeom prst="line">
+            <a:avLst/>
+          </a:prstGeom>
+        </p:spPr>
+        <p:style>
+          <a:lnRef idx="1">
+            <a:schemeClr val="accent1"/>
+          </a:lnRef>
+          <a:fillRef idx="0">
+            <a:schemeClr val="accent1"/>
+          </a:fillRef>
+          <a:effectRef idx="0">
+            <a:schemeClr val="accent1"/>
+          </a:effectRef>
+          <a:fontRef idx="minor">
+            <a:schemeClr val="tx1"/>
+          </a:fontRef>
+        </p:style>
+      </p:cxnSp>
+      <p:sp>
+        <p:nvSpPr>
+          <p:cNvPr id="42" name="Rectangle 41"/>
+          <p:cNvSpPr/>
+          <p:nvPr/>
+        </p:nvSpPr>
+        <p:spPr>
+          <a:xfrm>
+            <a:off x="2566518" y="2995826"/>
+            <a:ext cx="1200955" cy="449955"/>
+          </a:xfrm>
+          <a:prstGeom prst="rect">
+            <a:avLst/>
+          </a:prstGeom>
+        </p:spPr>
+        <p:style>
+          <a:lnRef idx="2">
+            <a:schemeClr val="accent1">
+              <a:shade val="50000"/>
+            </a:schemeClr>
+          </a:lnRef>
+          <a:fillRef idx="1">
+            <a:schemeClr val="accent1"/>
+          </a:fillRef>
+          <a:effectRef idx="0">
+            <a:schemeClr val="accent1"/>
+          </a:effectRef>
+          <a:fontRef idx="minor">
+            <a:schemeClr val="lt1"/>
+          </a:fontRef>
+        </p:style>
+        <p:txBody>
+          <a:bodyPr rtlCol="0" anchor="ctr"/>
+          <a:lstStyle/>
+          <a:p>
+            <a:pPr algn="ctr"/>
+            <a:r>
+              <a:rPr lang="en-US" sz="1200" dirty="0" smtClean="0"/>
+              <a:t>Position</a:t>
+            </a:r>
+            <a:endParaRPr lang="en-US" sz="1200" dirty="0"/>
+          </a:p>
+        </p:txBody>
+      </p:sp>
+      <p:sp>
+        <p:nvSpPr>
+          <p:cNvPr id="43" name="Oval 42"/>
+          <p:cNvSpPr/>
+          <p:nvPr/>
+        </p:nvSpPr>
+        <p:spPr>
+          <a:xfrm>
+            <a:off x="2408349" y="3665528"/>
+            <a:ext cx="1621403" cy="389830"/>
+          </a:xfrm>
+          <a:prstGeom prst="ellipse">
+            <a:avLst/>
+          </a:prstGeom>
+        </p:spPr>
+        <p:style>
+          <a:lnRef idx="2">
+            <a:schemeClr val="accent1">
+              <a:shade val="50000"/>
+            </a:schemeClr>
+          </a:lnRef>
+          <a:fillRef idx="1">
+            <a:schemeClr val="accent1"/>
+          </a:fillRef>
+          <a:effectRef idx="0">
+            <a:schemeClr val="accent1"/>
+          </a:effectRef>
+          <a:fontRef idx="minor">
+            <a:schemeClr val="lt1"/>
+          </a:fontRef>
+        </p:style>
+        <p:txBody>
+          <a:bodyPr rtlCol="0" anchor="ctr"/>
+          <a:lstStyle/>
+          <a:p>
+            <a:pPr algn="ctr"/>
+            <a:r>
+              <a:rPr lang="en-US" sz="1200" dirty="0" err="1" smtClean="0"/>
+              <a:t>Position_name</a:t>
+            </a:r>
+            <a:endParaRPr lang="en-US" sz="1200" dirty="0"/>
+          </a:p>
+        </p:txBody>
+      </p:sp>
+      <p:cxnSp>
+        <p:nvCxnSpPr>
+          <p:cNvPr id="54" name="Straight Connector 53"/>
+          <p:cNvCxnSpPr>
+            <a:stCxn id="43" idx="0"/>
+            <a:endCxn id="42" idx="2"/>
+          </p:cNvCxnSpPr>
+          <p:nvPr/>
+        </p:nvCxnSpPr>
+        <p:spPr>
+          <a:xfrm flipH="1" flipV="1">
+            <a:off x="3166996" y="3445781"/>
+            <a:ext cx="52055" cy="219747"/>
+          </a:xfrm>
+          <a:prstGeom prst="line">
+            <a:avLst/>
+          </a:prstGeom>
+        </p:spPr>
+        <p:style>
+          <a:lnRef idx="1">
+            <a:schemeClr val="accent1"/>
+          </a:lnRef>
+          <a:fillRef idx="0">
+            <a:schemeClr val="accent1"/>
+          </a:fillRef>
+          <a:effectRef idx="0">
+            <a:schemeClr val="accent1"/>
+          </a:effectRef>
+          <a:fontRef idx="minor">
+            <a:schemeClr val="tx1"/>
+          </a:fontRef>
+        </p:style>
+      </p:cxnSp>
+      <p:sp>
+        <p:nvSpPr>
+          <p:cNvPr id="58" name="Diamond 57"/>
+          <p:cNvSpPr/>
+          <p:nvPr/>
+        </p:nvSpPr>
+        <p:spPr>
+          <a:xfrm>
+            <a:off x="2418814" y="2157815"/>
+            <a:ext cx="1505650" cy="413849"/>
+          </a:xfrm>
+          <a:prstGeom prst="diamond">
+            <a:avLst/>
+          </a:prstGeom>
+        </p:spPr>
+        <p:style>
+          <a:lnRef idx="2">
+            <a:schemeClr val="accent1">
+              <a:shade val="50000"/>
+            </a:schemeClr>
+          </a:lnRef>
+          <a:fillRef idx="1">
+            <a:schemeClr val="accent1"/>
+          </a:fillRef>
+          <a:effectRef idx="0">
+            <a:schemeClr val="accent1"/>
+          </a:effectRef>
+          <a:fontRef idx="minor">
+            <a:schemeClr val="lt1"/>
+          </a:fontRef>
+        </p:style>
+        <p:txBody>
+          <a:bodyPr rtlCol="0" anchor="ctr"/>
+          <a:lstStyle/>
+          <a:p>
+            <a:pPr algn="ctr"/>
+            <a:r>
+              <a:rPr lang="en-US" sz="1200" dirty="0" smtClean="0"/>
+              <a:t>position</a:t>
+            </a:r>
+            <a:endParaRPr lang="en-US" sz="1200" dirty="0"/>
+          </a:p>
+        </p:txBody>
+      </p:sp>
+      <p:cxnSp>
+        <p:nvCxnSpPr>
+          <p:cNvPr id="69" name="Straight Connector 68"/>
+          <p:cNvCxnSpPr>
+            <a:stCxn id="58" idx="2"/>
+            <a:endCxn id="42" idx="0"/>
+          </p:cNvCxnSpPr>
+          <p:nvPr/>
+        </p:nvCxnSpPr>
+        <p:spPr>
+          <a:xfrm flipH="1">
+            <a:off x="3166996" y="2571664"/>
+            <a:ext cx="4643" cy="424162"/>
+          </a:xfrm>
+          <a:prstGeom prst="line">
+            <a:avLst/>
+          </a:prstGeom>
+        </p:spPr>
+        <p:style>
+          <a:lnRef idx="1">
+            <a:schemeClr val="accent1"/>
+          </a:lnRef>
+          <a:fillRef idx="0">
+            <a:schemeClr val="accent1"/>
+          </a:fillRef>
+          <a:effectRef idx="0">
+            <a:schemeClr val="accent1"/>
+          </a:effectRef>
+          <a:fontRef idx="minor">
+            <a:schemeClr val="tx1"/>
+          </a:fontRef>
+        </p:style>
+      </p:cxnSp>
+      <p:cxnSp>
+        <p:nvCxnSpPr>
+          <p:cNvPr id="88" name="Straight Connector 87"/>
+          <p:cNvCxnSpPr>
+            <a:stCxn id="58" idx="0"/>
+            <a:endCxn id="4" idx="1"/>
+          </p:cNvCxnSpPr>
+          <p:nvPr/>
+        </p:nvCxnSpPr>
+        <p:spPr>
+          <a:xfrm flipV="1">
+            <a:off x="3171639" y="1751526"/>
+            <a:ext cx="953805" cy="406289"/>
+          </a:xfrm>
+          <a:prstGeom prst="line">
+            <a:avLst/>
+          </a:prstGeom>
+        </p:spPr>
+        <p:style>
+          <a:lnRef idx="1">
+            <a:schemeClr val="accent1"/>
+          </a:lnRef>
+          <a:fillRef idx="0">
+            <a:schemeClr val="accent1"/>
+          </a:fillRef>
+          <a:effectRef idx="0">
+            <a:schemeClr val="accent1"/>
+          </a:effectRef>
+          <a:fontRef idx="minor">
+            <a:schemeClr val="tx1"/>
+          </a:fontRef>
+        </p:style>
+      </p:cxnSp>
+      <p:sp>
+        <p:nvSpPr>
+          <p:cNvPr id="112" name="TextBox 111"/>
+          <p:cNvSpPr txBox="1"/>
+          <p:nvPr/>
+        </p:nvSpPr>
+        <p:spPr>
+          <a:xfrm>
+            <a:off x="3785713" y="1552250"/>
+            <a:ext cx="428322" cy="246221"/>
+          </a:xfrm>
+          <a:prstGeom prst="rect">
+            <a:avLst/>
+          </a:prstGeom>
+          <a:noFill/>
+        </p:spPr>
+        <p:txBody>
+          <a:bodyPr wrap="none" rtlCol="0">
+            <a:spAutoFit/>
+          </a:bodyPr>
+          <a:lstStyle/>
+          <a:p>
+            <a:r>
+              <a:rPr lang="en-US" sz="1000" dirty="0" smtClean="0"/>
+              <a:t>{1,1}</a:t>
+            </a:r>
+            <a:endParaRPr lang="en-US" sz="1000" dirty="0"/>
+          </a:p>
+        </p:txBody>
+      </p:sp>
+      <p:sp>
+        <p:nvSpPr>
+          <p:cNvPr id="114" name="TextBox 113"/>
+          <p:cNvSpPr txBox="1"/>
+          <p:nvPr/>
+        </p:nvSpPr>
+        <p:spPr>
+          <a:xfrm>
+            <a:off x="3071486" y="2775398"/>
+            <a:ext cx="428322" cy="246221"/>
+          </a:xfrm>
+          <a:prstGeom prst="rect">
+            <a:avLst/>
+          </a:prstGeom>
+          <a:noFill/>
+        </p:spPr>
+        <p:txBody>
+          <a:bodyPr wrap="none" rtlCol="0">
+            <a:spAutoFit/>
+          </a:bodyPr>
+          <a:lstStyle/>
+          <a:p>
+            <a:r>
+              <a:rPr lang="en-US" sz="1000" dirty="0" smtClean="0"/>
+              <a:t>{1,1}</a:t>
+            </a:r>
+            <a:endParaRPr lang="en-US" sz="1000" dirty="0"/>
+          </a:p>
+        </p:txBody>
+      </p:sp>
     </p:spTree>
     <p:extLst>
       <p:ext uri="{BB962C8B-B14F-4D97-AF65-F5344CB8AC3E}">

</xml_diff>